<commit_message>
SOLID Principles presentation update
</commit_message>
<xml_diff>
--- a/presentations/SOLID Design Principles.pptx
+++ b/presentations/SOLID Design Principles.pptx
@@ -8,15 +8,16 @@
     <p:sldId id="256" r:id="rId2"/>
     <p:sldId id="257" r:id="rId3"/>
     <p:sldId id="258" r:id="rId4"/>
-    <p:sldId id="264" r:id="rId5"/>
-    <p:sldId id="259" r:id="rId6"/>
-    <p:sldId id="265" r:id="rId7"/>
-    <p:sldId id="260" r:id="rId8"/>
-    <p:sldId id="266" r:id="rId9"/>
-    <p:sldId id="261" r:id="rId10"/>
-    <p:sldId id="267" r:id="rId11"/>
-    <p:sldId id="262" r:id="rId12"/>
-    <p:sldId id="268" r:id="rId13"/>
+    <p:sldId id="269" r:id="rId5"/>
+    <p:sldId id="264" r:id="rId6"/>
+    <p:sldId id="259" r:id="rId7"/>
+    <p:sldId id="265" r:id="rId8"/>
+    <p:sldId id="260" r:id="rId9"/>
+    <p:sldId id="266" r:id="rId10"/>
+    <p:sldId id="261" r:id="rId11"/>
+    <p:sldId id="267" r:id="rId12"/>
+    <p:sldId id="262" r:id="rId13"/>
+    <p:sldId id="268" r:id="rId14"/>
   </p:sldIdLst>
   <p:sldSz cx="12192000" cy="6858000"/>
   <p:notesSz cx="6858000" cy="9144000"/>
@@ -270,7 +271,7 @@
           <a:p>
             <a:fld id="{CC4CF41B-4421-9F45-9815-7568C574035A}" type="datetimeFigureOut">
               <a:rPr lang="en-US" smtClean="0"/>
-              <a:t>8/3/21</a:t>
+              <a:t>2/3/22</a:t>
             </a:fld>
             <a:endParaRPr lang="en-US"/>
           </a:p>
@@ -340,13 +341,13 @@
   <p:clrMapOvr>
     <a:masterClrMapping/>
   </p:clrMapOvr>
-  <mc:AlternateContent xmlns:mc="http://schemas.openxmlformats.org/markup-compatibility/2006">
-    <mc:Choice xmlns:p14="http://schemas.microsoft.com/office/powerpoint/2010/main" Requires="p14">
+  <mc:AlternateContent xmlns:mc="http://schemas.openxmlformats.org/markup-compatibility/2006" xmlns:p14="http://schemas.microsoft.com/office/powerpoint/2010/main">
+    <mc:Choice Requires="p14">
       <p:transition spd="med" p14:dur="700">
         <p:fade/>
       </p:transition>
     </mc:Choice>
-    <mc:Fallback>
+    <mc:Fallback xmlns="">
       <p:transition spd="med">
         <p:fade/>
       </p:transition>
@@ -480,7 +481,7 @@
           <a:p>
             <a:fld id="{CC4CF41B-4421-9F45-9815-7568C574035A}" type="datetimeFigureOut">
               <a:rPr lang="en-US" smtClean="0"/>
-              <a:t>8/3/21</a:t>
+              <a:t>2/3/22</a:t>
             </a:fld>
             <a:endParaRPr lang="en-US"/>
           </a:p>
@@ -550,13 +551,13 @@
   <p:clrMapOvr>
     <a:masterClrMapping/>
   </p:clrMapOvr>
-  <mc:AlternateContent xmlns:mc="http://schemas.openxmlformats.org/markup-compatibility/2006">
-    <mc:Choice xmlns:p14="http://schemas.microsoft.com/office/powerpoint/2010/main" Requires="p14">
+  <mc:AlternateContent xmlns:mc="http://schemas.openxmlformats.org/markup-compatibility/2006" xmlns:p14="http://schemas.microsoft.com/office/powerpoint/2010/main">
+    <mc:Choice Requires="p14">
       <p:transition spd="med" p14:dur="700">
         <p:fade/>
       </p:transition>
     </mc:Choice>
-    <mc:Fallback>
+    <mc:Fallback xmlns="">
       <p:transition spd="med">
         <p:fade/>
       </p:transition>
@@ -700,7 +701,7 @@
           <a:p>
             <a:fld id="{CC4CF41B-4421-9F45-9815-7568C574035A}" type="datetimeFigureOut">
               <a:rPr lang="en-US" smtClean="0"/>
-              <a:t>8/3/21</a:t>
+              <a:t>2/3/22</a:t>
             </a:fld>
             <a:endParaRPr lang="en-US"/>
           </a:p>
@@ -770,13 +771,13 @@
   <p:clrMapOvr>
     <a:masterClrMapping/>
   </p:clrMapOvr>
-  <mc:AlternateContent xmlns:mc="http://schemas.openxmlformats.org/markup-compatibility/2006">
-    <mc:Choice xmlns:p14="http://schemas.microsoft.com/office/powerpoint/2010/main" Requires="p14">
+  <mc:AlternateContent xmlns:mc="http://schemas.openxmlformats.org/markup-compatibility/2006" xmlns:p14="http://schemas.microsoft.com/office/powerpoint/2010/main">
+    <mc:Choice Requires="p14">
       <p:transition spd="med" p14:dur="700">
         <p:fade/>
       </p:transition>
     </mc:Choice>
-    <mc:Fallback>
+    <mc:Fallback xmlns="">
       <p:transition spd="med">
         <p:fade/>
       </p:transition>
@@ -910,7 +911,7 @@
           <a:p>
             <a:fld id="{CC4CF41B-4421-9F45-9815-7568C574035A}" type="datetimeFigureOut">
               <a:rPr lang="en-US" smtClean="0"/>
-              <a:t>8/3/21</a:t>
+              <a:t>2/3/22</a:t>
             </a:fld>
             <a:endParaRPr lang="en-US"/>
           </a:p>
@@ -980,13 +981,13 @@
   <p:clrMapOvr>
     <a:masterClrMapping/>
   </p:clrMapOvr>
-  <mc:AlternateContent xmlns:mc="http://schemas.openxmlformats.org/markup-compatibility/2006">
-    <mc:Choice xmlns:p14="http://schemas.microsoft.com/office/powerpoint/2010/main" Requires="p14">
+  <mc:AlternateContent xmlns:mc="http://schemas.openxmlformats.org/markup-compatibility/2006" xmlns:p14="http://schemas.microsoft.com/office/powerpoint/2010/main">
+    <mc:Choice Requires="p14">
       <p:transition spd="med" p14:dur="700">
         <p:fade/>
       </p:transition>
     </mc:Choice>
-    <mc:Fallback>
+    <mc:Fallback xmlns="">
       <p:transition spd="med">
         <p:fade/>
       </p:transition>
@@ -1197,7 +1198,7 @@
           <a:p>
             <a:fld id="{CC4CF41B-4421-9F45-9815-7568C574035A}" type="datetimeFigureOut">
               <a:rPr lang="en-US" smtClean="0"/>
-              <a:t>8/3/21</a:t>
+              <a:t>2/3/22</a:t>
             </a:fld>
             <a:endParaRPr lang="en-US"/>
           </a:p>
@@ -1267,13 +1268,13 @@
   <p:clrMapOvr>
     <a:masterClrMapping/>
   </p:clrMapOvr>
-  <mc:AlternateContent xmlns:mc="http://schemas.openxmlformats.org/markup-compatibility/2006">
-    <mc:Choice xmlns:p14="http://schemas.microsoft.com/office/powerpoint/2010/main" Requires="p14">
+  <mc:AlternateContent xmlns:mc="http://schemas.openxmlformats.org/markup-compatibility/2006" xmlns:p14="http://schemas.microsoft.com/office/powerpoint/2010/main">
+    <mc:Choice Requires="p14">
       <p:transition spd="med" p14:dur="700">
         <p:fade/>
       </p:transition>
     </mc:Choice>
-    <mc:Fallback>
+    <mc:Fallback xmlns="">
       <p:transition spd="med">
         <p:fade/>
       </p:transition>
@@ -1474,7 +1475,7 @@
           <a:p>
             <a:fld id="{CC4CF41B-4421-9F45-9815-7568C574035A}" type="datetimeFigureOut">
               <a:rPr lang="en-US" smtClean="0"/>
-              <a:t>8/3/21</a:t>
+              <a:t>2/3/22</a:t>
             </a:fld>
             <a:endParaRPr lang="en-US"/>
           </a:p>
@@ -1544,13 +1545,13 @@
   <p:clrMapOvr>
     <a:masterClrMapping/>
   </p:clrMapOvr>
-  <mc:AlternateContent xmlns:mc="http://schemas.openxmlformats.org/markup-compatibility/2006">
-    <mc:Choice xmlns:p14="http://schemas.microsoft.com/office/powerpoint/2010/main" Requires="p14">
+  <mc:AlternateContent xmlns:mc="http://schemas.openxmlformats.org/markup-compatibility/2006" xmlns:p14="http://schemas.microsoft.com/office/powerpoint/2010/main">
+    <mc:Choice Requires="p14">
       <p:transition spd="med" p14:dur="700">
         <p:fade/>
       </p:transition>
     </mc:Choice>
-    <mc:Fallback>
+    <mc:Fallback xmlns="">
       <p:transition spd="med">
         <p:fade/>
       </p:transition>
@@ -1898,7 +1899,7 @@
           <a:p>
             <a:fld id="{CC4CF41B-4421-9F45-9815-7568C574035A}" type="datetimeFigureOut">
               <a:rPr lang="en-US" smtClean="0"/>
-              <a:t>8/3/21</a:t>
+              <a:t>2/3/22</a:t>
             </a:fld>
             <a:endParaRPr lang="en-US"/>
           </a:p>
@@ -1968,13 +1969,13 @@
   <p:clrMapOvr>
     <a:masterClrMapping/>
   </p:clrMapOvr>
-  <mc:AlternateContent xmlns:mc="http://schemas.openxmlformats.org/markup-compatibility/2006">
-    <mc:Choice xmlns:p14="http://schemas.microsoft.com/office/powerpoint/2010/main" Requires="p14">
+  <mc:AlternateContent xmlns:mc="http://schemas.openxmlformats.org/markup-compatibility/2006" xmlns:p14="http://schemas.microsoft.com/office/powerpoint/2010/main">
+    <mc:Choice Requires="p14">
       <p:transition spd="med" p14:dur="700">
         <p:fade/>
       </p:transition>
     </mc:Choice>
-    <mc:Fallback>
+    <mc:Fallback xmlns="">
       <p:transition spd="med">
         <p:fade/>
       </p:transition>
@@ -2051,7 +2052,7 @@
           <a:p>
             <a:fld id="{CC4CF41B-4421-9F45-9815-7568C574035A}" type="datetimeFigureOut">
               <a:rPr lang="en-US" smtClean="0"/>
-              <a:t>8/3/21</a:t>
+              <a:t>2/3/22</a:t>
             </a:fld>
             <a:endParaRPr lang="en-US"/>
           </a:p>
@@ -2121,13 +2122,13 @@
   <p:clrMapOvr>
     <a:masterClrMapping/>
   </p:clrMapOvr>
-  <mc:AlternateContent xmlns:mc="http://schemas.openxmlformats.org/markup-compatibility/2006">
-    <mc:Choice xmlns:p14="http://schemas.microsoft.com/office/powerpoint/2010/main" Requires="p14">
+  <mc:AlternateContent xmlns:mc="http://schemas.openxmlformats.org/markup-compatibility/2006" xmlns:p14="http://schemas.microsoft.com/office/powerpoint/2010/main">
+    <mc:Choice Requires="p14">
       <p:transition spd="med" p14:dur="700">
         <p:fade/>
       </p:transition>
     </mc:Choice>
-    <mc:Fallback>
+    <mc:Fallback xmlns="">
       <p:transition spd="med">
         <p:fade/>
       </p:transition>
@@ -2176,7 +2177,7 @@
           <a:p>
             <a:fld id="{CC4CF41B-4421-9F45-9815-7568C574035A}" type="datetimeFigureOut">
               <a:rPr lang="en-US" smtClean="0"/>
-              <a:t>8/3/21</a:t>
+              <a:t>2/3/22</a:t>
             </a:fld>
             <a:endParaRPr lang="en-US"/>
           </a:p>
@@ -2246,13 +2247,13 @@
   <p:clrMapOvr>
     <a:masterClrMapping/>
   </p:clrMapOvr>
-  <mc:AlternateContent xmlns:mc="http://schemas.openxmlformats.org/markup-compatibility/2006">
-    <mc:Choice xmlns:p14="http://schemas.microsoft.com/office/powerpoint/2010/main" Requires="p14">
+  <mc:AlternateContent xmlns:mc="http://schemas.openxmlformats.org/markup-compatibility/2006" xmlns:p14="http://schemas.microsoft.com/office/powerpoint/2010/main">
+    <mc:Choice Requires="p14">
       <p:transition spd="med" p14:dur="700">
         <p:fade/>
       </p:transition>
     </mc:Choice>
-    <mc:Fallback>
+    <mc:Fallback xmlns="">
       <p:transition spd="med">
         <p:fade/>
       </p:transition>
@@ -2499,7 +2500,7 @@
           <a:p>
             <a:fld id="{CC4CF41B-4421-9F45-9815-7568C574035A}" type="datetimeFigureOut">
               <a:rPr lang="en-US" smtClean="0"/>
-              <a:t>8/3/21</a:t>
+              <a:t>2/3/22</a:t>
             </a:fld>
             <a:endParaRPr lang="en-US"/>
           </a:p>
@@ -2569,13 +2570,13 @@
   <p:clrMapOvr>
     <a:masterClrMapping/>
   </p:clrMapOvr>
-  <mc:AlternateContent xmlns:mc="http://schemas.openxmlformats.org/markup-compatibility/2006">
-    <mc:Choice xmlns:p14="http://schemas.microsoft.com/office/powerpoint/2010/main" Requires="p14">
+  <mc:AlternateContent xmlns:mc="http://schemas.openxmlformats.org/markup-compatibility/2006" xmlns:p14="http://schemas.microsoft.com/office/powerpoint/2010/main">
+    <mc:Choice Requires="p14">
       <p:transition spd="med" p14:dur="700">
         <p:fade/>
       </p:transition>
     </mc:Choice>
-    <mc:Fallback>
+    <mc:Fallback xmlns="">
       <p:transition spd="med">
         <p:fade/>
       </p:transition>
@@ -2799,7 +2800,7 @@
           <a:p>
             <a:fld id="{CC4CF41B-4421-9F45-9815-7568C574035A}" type="datetimeFigureOut">
               <a:rPr lang="en-US" smtClean="0"/>
-              <a:t>8/3/21</a:t>
+              <a:t>2/3/22</a:t>
             </a:fld>
             <a:endParaRPr lang="en-US"/>
           </a:p>
@@ -2869,13 +2870,13 @@
   <p:clrMapOvr>
     <a:masterClrMapping/>
   </p:clrMapOvr>
-  <mc:AlternateContent xmlns:mc="http://schemas.openxmlformats.org/markup-compatibility/2006">
-    <mc:Choice xmlns:p14="http://schemas.microsoft.com/office/powerpoint/2010/main" Requires="p14">
+  <mc:AlternateContent xmlns:mc="http://schemas.openxmlformats.org/markup-compatibility/2006" xmlns:p14="http://schemas.microsoft.com/office/powerpoint/2010/main">
+    <mc:Choice Requires="p14">
       <p:transition spd="med" p14:dur="700">
         <p:fade/>
       </p:transition>
     </mc:Choice>
-    <mc:Fallback>
+    <mc:Fallback xmlns="">
       <p:transition spd="med">
         <p:fade/>
       </p:transition>
@@ -3052,7 +3053,7 @@
           <a:p>
             <a:fld id="{CC4CF41B-4421-9F45-9815-7568C574035A}" type="datetimeFigureOut">
               <a:rPr lang="en-US" smtClean="0"/>
-              <a:t>8/3/21</a:t>
+              <a:t>2/3/22</a:t>
             </a:fld>
             <a:endParaRPr lang="en-US"/>
           </a:p>
@@ -3169,13 +3170,13 @@
     <p:sldLayoutId id="2147483658" r:id="rId10"/>
     <p:sldLayoutId id="2147483659" r:id="rId11"/>
   </p:sldLayoutIdLst>
-  <mc:AlternateContent xmlns:mc="http://schemas.openxmlformats.org/markup-compatibility/2006">
-    <mc:Choice xmlns:p14="http://schemas.microsoft.com/office/powerpoint/2010/main" Requires="p14">
+  <mc:AlternateContent xmlns:mc="http://schemas.openxmlformats.org/markup-compatibility/2006" xmlns:p14="http://schemas.microsoft.com/office/powerpoint/2010/main">
+    <mc:Choice Requires="p14">
       <p:transition spd="med" p14:dur="700">
         <p:fade/>
       </p:transition>
     </mc:Choice>
-    <mc:Fallback>
+    <mc:Fallback xmlns="">
       <p:transition spd="med">
         <p:fade/>
       </p:transition>
@@ -3548,13 +3549,13 @@
   <p:clrMapOvr>
     <a:masterClrMapping/>
   </p:clrMapOvr>
-  <mc:AlternateContent xmlns:mc="http://schemas.openxmlformats.org/markup-compatibility/2006">
-    <mc:Choice xmlns:p14="http://schemas.microsoft.com/office/powerpoint/2010/main" Requires="p14">
+  <mc:AlternateContent xmlns:mc="http://schemas.openxmlformats.org/markup-compatibility/2006" xmlns:p14="http://schemas.microsoft.com/office/powerpoint/2010/main">
+    <mc:Choice Requires="p14">
       <p:transition spd="med" p14:dur="700">
         <p:fade/>
       </p:transition>
     </mc:Choice>
-    <mc:Fallback>
+    <mc:Fallback xmlns="">
       <p:transition spd="med">
         <p:fade/>
       </p:transition>
@@ -3564,6 +3565,427 @@
 </file>
 
 <file path=ppt/slides/slide10.xml><?xml version="1.0" encoding="utf-8"?>
+<p:sld xmlns:a="http://schemas.openxmlformats.org/drawingml/2006/main" xmlns:r="http://schemas.openxmlformats.org/officeDocument/2006/relationships" xmlns:p="http://schemas.openxmlformats.org/presentationml/2006/main">
+  <p:cSld>
+    <p:spTree>
+      <p:nvGrpSpPr>
+        <p:cNvPr id="1" name=""/>
+        <p:cNvGrpSpPr/>
+        <p:nvPr/>
+      </p:nvGrpSpPr>
+      <p:grpSpPr>
+        <a:xfrm>
+          <a:off x="0" y="0"/>
+          <a:ext cx="0" cy="0"/>
+          <a:chOff x="0" y="0"/>
+          <a:chExt cx="0" cy="0"/>
+        </a:xfrm>
+      </p:grpSpPr>
+      <p:sp>
+        <p:nvSpPr>
+          <p:cNvPr id="2" name="Title 1">
+            <a:extLst>
+              <a:ext uri="{FF2B5EF4-FFF2-40B4-BE49-F238E27FC236}">
+                <a16:creationId xmlns:a16="http://schemas.microsoft.com/office/drawing/2014/main" id="{B6695F51-BDF2-9B42-88BF-7E11C919BE9B}"/>
+              </a:ext>
+            </a:extLst>
+          </p:cNvPr>
+          <p:cNvSpPr>
+            <a:spLocks noGrp="1"/>
+          </p:cNvSpPr>
+          <p:nvPr>
+            <p:ph type="title"/>
+          </p:nvPr>
+        </p:nvSpPr>
+        <p:spPr/>
+        <p:txBody>
+          <a:bodyPr/>
+          <a:lstStyle/>
+          <a:p>
+            <a:r>
+              <a:rPr lang="en-US" b="1" dirty="0"/>
+              <a:t>Interface Segregation Principle (ISP)</a:t>
+            </a:r>
+          </a:p>
+        </p:txBody>
+      </p:sp>
+      <p:sp>
+        <p:nvSpPr>
+          <p:cNvPr id="3" name="Content Placeholder 2">
+            <a:extLst>
+              <a:ext uri="{FF2B5EF4-FFF2-40B4-BE49-F238E27FC236}">
+                <a16:creationId xmlns:a16="http://schemas.microsoft.com/office/drawing/2014/main" id="{8C64B73B-45A9-0D43-A26E-22CE28C959FF}"/>
+              </a:ext>
+            </a:extLst>
+          </p:cNvPr>
+          <p:cNvSpPr>
+            <a:spLocks noGrp="1"/>
+          </p:cNvSpPr>
+          <p:nvPr>
+            <p:ph idx="1"/>
+          </p:nvPr>
+        </p:nvSpPr>
+        <p:spPr/>
+        <p:txBody>
+          <a:bodyPr/>
+          <a:lstStyle/>
+          <a:p>
+            <a:r>
+              <a:rPr lang="en-US" dirty="0"/>
+              <a:t>Many client-specific interfaces are better than one general-purpose interface.</a:t>
+            </a:r>
+          </a:p>
+          <a:p>
+            <a:pPr lvl="1"/>
+            <a:r>
+              <a:rPr lang="en-US" dirty="0"/>
+              <a:t>Avoid the “fat” interface!</a:t>
+            </a:r>
+          </a:p>
+          <a:p>
+            <a:pPr lvl="1"/>
+            <a:r>
+              <a:rPr lang="en-US" dirty="0"/>
+              <a:t>Favor smaller role-based interfaces as opposed to one larger interface that has methods you may not be interested in.</a:t>
+            </a:r>
+          </a:p>
+          <a:p>
+            <a:r>
+              <a:rPr lang="en-US" dirty="0"/>
+              <a:t>Implementations can extend multiple role interfaces.</a:t>
+            </a:r>
+          </a:p>
+          <a:p>
+            <a:r>
+              <a:rPr lang="en-US" dirty="0"/>
+              <a:t>Decompose large interfaces into smaller ones based on the role they play in the system.</a:t>
+            </a:r>
+          </a:p>
+          <a:p>
+            <a:r>
+              <a:rPr lang="en-US" dirty="0"/>
+              <a:t>Delegation using the adapter pattern can be helpful here for composing implementations that support multiple role interfaces.</a:t>
+            </a:r>
+          </a:p>
+        </p:txBody>
+      </p:sp>
+    </p:spTree>
+    <p:extLst>
+      <p:ext uri="{BB962C8B-B14F-4D97-AF65-F5344CB8AC3E}">
+        <p14:creationId xmlns:p14="http://schemas.microsoft.com/office/powerpoint/2010/main" val="3745764711"/>
+      </p:ext>
+    </p:extLst>
+  </p:cSld>
+  <p:clrMapOvr>
+    <a:masterClrMapping/>
+  </p:clrMapOvr>
+  <mc:AlternateContent xmlns:mc="http://schemas.openxmlformats.org/markup-compatibility/2006" xmlns:p14="http://schemas.microsoft.com/office/powerpoint/2010/main">
+    <mc:Choice Requires="p14">
+      <p:transition spd="med" p14:dur="700">
+        <p:fade/>
+      </p:transition>
+    </mc:Choice>
+    <mc:Fallback xmlns="">
+      <p:transition spd="med">
+        <p:fade/>
+      </p:transition>
+    </mc:Fallback>
+  </mc:AlternateContent>
+  <p:timing>
+    <p:tnLst>
+      <p:par>
+        <p:cTn id="1" dur="indefinite" restart="never" nodeType="tmRoot">
+          <p:childTnLst>
+            <p:seq concurrent="1" nextAc="seek">
+              <p:cTn id="2" dur="indefinite" nodeType="mainSeq">
+                <p:childTnLst>
+                  <p:par>
+                    <p:cTn id="3" fill="hold">
+                      <p:stCondLst>
+                        <p:cond delay="indefinite"/>
+                      </p:stCondLst>
+                      <p:childTnLst>
+                        <p:par>
+                          <p:cTn id="4" fill="hold">
+                            <p:stCondLst>
+                              <p:cond delay="0"/>
+                            </p:stCondLst>
+                            <p:childTnLst>
+                              <p:par>
+                                <p:cTn id="5" presetID="1" presetClass="entr" presetSubtype="0" fill="hold" grpId="0" nodeType="clickEffect">
+                                  <p:stCondLst>
+                                    <p:cond delay="0"/>
+                                  </p:stCondLst>
+                                  <p:childTnLst>
+                                    <p:set>
+                                      <p:cBhvr>
+                                        <p:cTn id="6" dur="1" fill="hold">
+                                          <p:stCondLst>
+                                            <p:cond delay="0"/>
+                                          </p:stCondLst>
+                                        </p:cTn>
+                                        <p:tgtEl>
+                                          <p:spTgt spid="3">
+                                            <p:txEl>
+                                              <p:pRg st="0" end="0"/>
+                                            </p:txEl>
+                                          </p:spTgt>
+                                        </p:tgtEl>
+                                        <p:attrNameLst>
+                                          <p:attrName>style.visibility</p:attrName>
+                                        </p:attrNameLst>
+                                      </p:cBhvr>
+                                      <p:to>
+                                        <p:strVal val="visible"/>
+                                      </p:to>
+                                    </p:set>
+                                  </p:childTnLst>
+                                </p:cTn>
+                              </p:par>
+                              <p:par>
+                                <p:cTn id="7" presetID="1" presetClass="entr" presetSubtype="0" fill="hold" grpId="0" nodeType="withEffect">
+                                  <p:stCondLst>
+                                    <p:cond delay="0"/>
+                                  </p:stCondLst>
+                                  <p:childTnLst>
+                                    <p:set>
+                                      <p:cBhvr>
+                                        <p:cTn id="8" dur="1" fill="hold">
+                                          <p:stCondLst>
+                                            <p:cond delay="0"/>
+                                          </p:stCondLst>
+                                        </p:cTn>
+                                        <p:tgtEl>
+                                          <p:spTgt spid="3">
+                                            <p:txEl>
+                                              <p:pRg st="1" end="1"/>
+                                            </p:txEl>
+                                          </p:spTgt>
+                                        </p:tgtEl>
+                                        <p:attrNameLst>
+                                          <p:attrName>style.visibility</p:attrName>
+                                        </p:attrNameLst>
+                                      </p:cBhvr>
+                                      <p:to>
+                                        <p:strVal val="visible"/>
+                                      </p:to>
+                                    </p:set>
+                                  </p:childTnLst>
+                                </p:cTn>
+                              </p:par>
+                              <p:par>
+                                <p:cTn id="9" presetID="1" presetClass="entr" presetSubtype="0" fill="hold" grpId="0" nodeType="withEffect">
+                                  <p:stCondLst>
+                                    <p:cond delay="0"/>
+                                  </p:stCondLst>
+                                  <p:childTnLst>
+                                    <p:set>
+                                      <p:cBhvr>
+                                        <p:cTn id="10" dur="1" fill="hold">
+                                          <p:stCondLst>
+                                            <p:cond delay="0"/>
+                                          </p:stCondLst>
+                                        </p:cTn>
+                                        <p:tgtEl>
+                                          <p:spTgt spid="3">
+                                            <p:txEl>
+                                              <p:pRg st="2" end="2"/>
+                                            </p:txEl>
+                                          </p:spTgt>
+                                        </p:tgtEl>
+                                        <p:attrNameLst>
+                                          <p:attrName>style.visibility</p:attrName>
+                                        </p:attrNameLst>
+                                      </p:cBhvr>
+                                      <p:to>
+                                        <p:strVal val="visible"/>
+                                      </p:to>
+                                    </p:set>
+                                  </p:childTnLst>
+                                </p:cTn>
+                              </p:par>
+                            </p:childTnLst>
+                          </p:cTn>
+                        </p:par>
+                      </p:childTnLst>
+                    </p:cTn>
+                  </p:par>
+                  <p:par>
+                    <p:cTn id="11" fill="hold">
+                      <p:stCondLst>
+                        <p:cond delay="indefinite"/>
+                      </p:stCondLst>
+                      <p:childTnLst>
+                        <p:par>
+                          <p:cTn id="12" fill="hold">
+                            <p:stCondLst>
+                              <p:cond delay="0"/>
+                            </p:stCondLst>
+                            <p:childTnLst>
+                              <p:par>
+                                <p:cTn id="13" presetID="1" presetClass="entr" presetSubtype="0" fill="hold" grpId="0" nodeType="clickEffect">
+                                  <p:stCondLst>
+                                    <p:cond delay="0"/>
+                                  </p:stCondLst>
+                                  <p:childTnLst>
+                                    <p:set>
+                                      <p:cBhvr>
+                                        <p:cTn id="14" dur="1" fill="hold">
+                                          <p:stCondLst>
+                                            <p:cond delay="0"/>
+                                          </p:stCondLst>
+                                        </p:cTn>
+                                        <p:tgtEl>
+                                          <p:spTgt spid="3">
+                                            <p:txEl>
+                                              <p:pRg st="3" end="3"/>
+                                            </p:txEl>
+                                          </p:spTgt>
+                                        </p:tgtEl>
+                                        <p:attrNameLst>
+                                          <p:attrName>style.visibility</p:attrName>
+                                        </p:attrNameLst>
+                                      </p:cBhvr>
+                                      <p:to>
+                                        <p:strVal val="visible"/>
+                                      </p:to>
+                                    </p:set>
+                                  </p:childTnLst>
+                                </p:cTn>
+                              </p:par>
+                            </p:childTnLst>
+                          </p:cTn>
+                        </p:par>
+                      </p:childTnLst>
+                    </p:cTn>
+                  </p:par>
+                  <p:par>
+                    <p:cTn id="15" fill="hold">
+                      <p:stCondLst>
+                        <p:cond delay="indefinite"/>
+                      </p:stCondLst>
+                      <p:childTnLst>
+                        <p:par>
+                          <p:cTn id="16" fill="hold">
+                            <p:stCondLst>
+                              <p:cond delay="0"/>
+                            </p:stCondLst>
+                            <p:childTnLst>
+                              <p:par>
+                                <p:cTn id="17" presetID="1" presetClass="entr" presetSubtype="0" fill="hold" grpId="0" nodeType="clickEffect">
+                                  <p:stCondLst>
+                                    <p:cond delay="0"/>
+                                  </p:stCondLst>
+                                  <p:childTnLst>
+                                    <p:set>
+                                      <p:cBhvr>
+                                        <p:cTn id="18" dur="1" fill="hold">
+                                          <p:stCondLst>
+                                            <p:cond delay="0"/>
+                                          </p:stCondLst>
+                                        </p:cTn>
+                                        <p:tgtEl>
+                                          <p:spTgt spid="3">
+                                            <p:txEl>
+                                              <p:pRg st="4" end="4"/>
+                                            </p:txEl>
+                                          </p:spTgt>
+                                        </p:tgtEl>
+                                        <p:attrNameLst>
+                                          <p:attrName>style.visibility</p:attrName>
+                                        </p:attrNameLst>
+                                      </p:cBhvr>
+                                      <p:to>
+                                        <p:strVal val="visible"/>
+                                      </p:to>
+                                    </p:set>
+                                  </p:childTnLst>
+                                </p:cTn>
+                              </p:par>
+                            </p:childTnLst>
+                          </p:cTn>
+                        </p:par>
+                      </p:childTnLst>
+                    </p:cTn>
+                  </p:par>
+                  <p:par>
+                    <p:cTn id="19" fill="hold">
+                      <p:stCondLst>
+                        <p:cond delay="indefinite"/>
+                      </p:stCondLst>
+                      <p:childTnLst>
+                        <p:par>
+                          <p:cTn id="20" fill="hold">
+                            <p:stCondLst>
+                              <p:cond delay="0"/>
+                            </p:stCondLst>
+                            <p:childTnLst>
+                              <p:par>
+                                <p:cTn id="21" presetID="1" presetClass="entr" presetSubtype="0" fill="hold" grpId="0" nodeType="clickEffect">
+                                  <p:stCondLst>
+                                    <p:cond delay="0"/>
+                                  </p:stCondLst>
+                                  <p:childTnLst>
+                                    <p:set>
+                                      <p:cBhvr>
+                                        <p:cTn id="22" dur="1" fill="hold">
+                                          <p:stCondLst>
+                                            <p:cond delay="0"/>
+                                          </p:stCondLst>
+                                        </p:cTn>
+                                        <p:tgtEl>
+                                          <p:spTgt spid="3">
+                                            <p:txEl>
+                                              <p:pRg st="5" end="5"/>
+                                            </p:txEl>
+                                          </p:spTgt>
+                                        </p:tgtEl>
+                                        <p:attrNameLst>
+                                          <p:attrName>style.visibility</p:attrName>
+                                        </p:attrNameLst>
+                                      </p:cBhvr>
+                                      <p:to>
+                                        <p:strVal val="visible"/>
+                                      </p:to>
+                                    </p:set>
+                                  </p:childTnLst>
+                                </p:cTn>
+                              </p:par>
+                            </p:childTnLst>
+                          </p:cTn>
+                        </p:par>
+                      </p:childTnLst>
+                    </p:cTn>
+                  </p:par>
+                </p:childTnLst>
+              </p:cTn>
+              <p:prevCondLst>
+                <p:cond evt="onPrev" delay="0">
+                  <p:tgtEl>
+                    <p:sldTgt/>
+                  </p:tgtEl>
+                </p:cond>
+              </p:prevCondLst>
+              <p:nextCondLst>
+                <p:cond evt="onNext" delay="0">
+                  <p:tgtEl>
+                    <p:sldTgt/>
+                  </p:tgtEl>
+                </p:cond>
+              </p:nextCondLst>
+            </p:seq>
+          </p:childTnLst>
+        </p:cTn>
+      </p:par>
+    </p:tnLst>
+    <p:bldLst>
+      <p:bldP spid="3" grpId="0" build="p"/>
+    </p:bldLst>
+  </p:timing>
+</p:sld>
+</file>
+
+<file path=ppt/slides/slide11.xml><?xml version="1.0" encoding="utf-8"?>
 <p:sld xmlns:a="http://schemas.openxmlformats.org/drawingml/2006/main" xmlns:r="http://schemas.openxmlformats.org/officeDocument/2006/relationships" xmlns:p="http://schemas.openxmlformats.org/presentationml/2006/main">
   <p:cSld>
     <p:spTree>
@@ -3602,7 +4024,7 @@
           <a:lstStyle/>
           <a:p>
             <a:r>
-              <a:rPr lang="en-US" dirty="0"/>
+              <a:rPr lang="en-US" b="1" dirty="0"/>
               <a:t>Benefits: Interface Segregation Principle</a:t>
             </a:r>
           </a:p>
@@ -3690,13 +4112,13 @@
   <p:clrMapOvr>
     <a:masterClrMapping/>
   </p:clrMapOvr>
-  <mc:AlternateContent xmlns:mc="http://schemas.openxmlformats.org/markup-compatibility/2006">
-    <mc:Choice xmlns:p14="http://schemas.microsoft.com/office/powerpoint/2010/main" Requires="p14">
+  <mc:AlternateContent xmlns:mc="http://schemas.openxmlformats.org/markup-compatibility/2006" xmlns:p14="http://schemas.microsoft.com/office/powerpoint/2010/main">
+    <mc:Choice Requires="p14">
       <p:transition spd="med" p14:dur="700">
         <p:fade/>
       </p:transition>
     </mc:Choice>
-    <mc:Fallback>
+    <mc:Fallback xmlns="">
       <p:transition spd="med">
         <p:fade/>
       </p:transition>
@@ -4009,7 +4431,7 @@
 </p:sld>
 </file>
 
-<file path=ppt/slides/slide11.xml><?xml version="1.0" encoding="utf-8"?>
+<file path=ppt/slides/slide12.xml><?xml version="1.0" encoding="utf-8"?>
 <p:sld xmlns:a="http://schemas.openxmlformats.org/drawingml/2006/main" xmlns:r="http://schemas.openxmlformats.org/officeDocument/2006/relationships" xmlns:p="http://schemas.openxmlformats.org/presentationml/2006/main">
   <p:cSld>
     <p:spTree>
@@ -4048,7 +4470,7 @@
           <a:lstStyle/>
           <a:p>
             <a:r>
-              <a:rPr lang="en-US" dirty="0"/>
+              <a:rPr lang="en-US" b="1" dirty="0"/>
               <a:t>Dependency Inversion Principle (DIP)</a:t>
             </a:r>
           </a:p>
@@ -4100,7 +4522,7 @@
             <a:pPr lvl="1"/>
             <a:r>
               <a:rPr lang="en-US" dirty="0"/>
-              <a:t>Clients should never create their dependencies. </a:t>
+              <a:t>Clients should never instantiate their dependencies. </a:t>
             </a:r>
           </a:p>
           <a:p>
@@ -4127,7 +4549,15 @@
             <a:pPr lvl="1"/>
             <a:r>
               <a:rPr lang="en-US" dirty="0"/>
-              <a:t>JNDI uses dependency lookup.</a:t>
+              <a:t>JNDI uses </a:t>
+            </a:r>
+            <a:r>
+              <a:rPr lang="en-US" i="1" dirty="0"/>
+              <a:t>dependency lookup</a:t>
+            </a:r>
+            <a:r>
+              <a:rPr lang="en-US" dirty="0"/>
+              <a:t>.</a:t>
             </a:r>
           </a:p>
           <a:p>
@@ -4153,13 +4583,13 @@
   <p:clrMapOvr>
     <a:masterClrMapping/>
   </p:clrMapOvr>
-  <mc:AlternateContent xmlns:mc="http://schemas.openxmlformats.org/markup-compatibility/2006">
-    <mc:Choice xmlns:p14="http://schemas.microsoft.com/office/powerpoint/2010/main" Requires="p14">
+  <mc:AlternateContent xmlns:mc="http://schemas.openxmlformats.org/markup-compatibility/2006" xmlns:p14="http://schemas.microsoft.com/office/powerpoint/2010/main">
+    <mc:Choice Requires="p14">
       <p:transition spd="med" p14:dur="700">
         <p:fade/>
       </p:transition>
     </mc:Choice>
-    <mc:Fallback>
+    <mc:Fallback xmlns="">
       <p:transition spd="med">
         <p:fade/>
       </p:transition>
@@ -4534,7 +4964,7 @@
 </p:sld>
 </file>
 
-<file path=ppt/slides/slide12.xml><?xml version="1.0" encoding="utf-8"?>
+<file path=ppt/slides/slide13.xml><?xml version="1.0" encoding="utf-8"?>
 <p:sld xmlns:a="http://schemas.openxmlformats.org/drawingml/2006/main" xmlns:r="http://schemas.openxmlformats.org/officeDocument/2006/relationships" xmlns:p="http://schemas.openxmlformats.org/presentationml/2006/main">
   <p:cSld>
     <p:spTree>
@@ -4573,7 +5003,7 @@
           <a:lstStyle/>
           <a:p>
             <a:r>
-              <a:rPr lang="en-US" dirty="0"/>
+              <a:rPr lang="en-US" b="1" dirty="0"/>
               <a:t>Benefits: Dependency Inversion Principle</a:t>
             </a:r>
           </a:p>
@@ -4622,14 +5052,21 @@
             <a:pPr lvl="1"/>
             <a:r>
               <a:rPr lang="en-US" dirty="0"/>
-              <a:t>New implementations can be swapped in easily and old implementations deprecated and removed.</a:t>
+              <a:t>The wiring can be easily changed via configuration.</a:t>
             </a:r>
           </a:p>
           <a:p>
             <a:pPr lvl="1"/>
             <a:r>
               <a:rPr lang="en-US" dirty="0"/>
-              <a:t>Modern frameworks like Spring Framework and Angular are built on the bedrock of the dependency inversion principle.</a:t>
+              <a:t>New implementations can be swapped in easily and old implementations deprecated and removed if you program to interfaces/contracts/protocols. </a:t>
+            </a:r>
+          </a:p>
+          <a:p>
+            <a:pPr lvl="1"/>
+            <a:r>
+              <a:rPr lang="en-US" dirty="0"/>
+              <a:t>Modern frameworks like Spring Framework and Angular are built on the bedrock of the Dependency Inversion Principle.</a:t>
             </a:r>
           </a:p>
         </p:txBody>
@@ -4644,13 +5081,13 @@
   <p:clrMapOvr>
     <a:masterClrMapping/>
   </p:clrMapOvr>
-  <mc:AlternateContent xmlns:mc="http://schemas.openxmlformats.org/markup-compatibility/2006">
-    <mc:Choice xmlns:p14="http://schemas.microsoft.com/office/powerpoint/2010/main" Requires="p14">
+  <mc:AlternateContent xmlns:mc="http://schemas.openxmlformats.org/markup-compatibility/2006" xmlns:p14="http://schemas.microsoft.com/office/powerpoint/2010/main">
+    <mc:Choice Requires="p14">
       <p:transition spd="med" p14:dur="700">
         <p:fade/>
       </p:transition>
     </mc:Choice>
-    <mc:Fallback>
+    <mc:Fallback xmlns="">
       <p:transition spd="med">
         <p:fade/>
       </p:transition>
@@ -4849,6 +5286,37 @@
                                   </p:childTnLst>
                                 </p:cTn>
                               </p:par>
+                              <p:par>
+                                <p:cTn id="17" presetID="1" presetClass="entr" presetSubtype="0" fill="hold" grpId="0" nodeType="withEffect">
+                                  <p:stCondLst>
+                                    <p:cond delay="0"/>
+                                  </p:stCondLst>
+                                  <p:childTnLst>
+                                    <p:set>
+                                      <p:cBhvr>
+                                        <p:cTn id="18" dur="1" fill="hold">
+                                          <p:stCondLst>
+                                            <p:cond delay="0"/>
+                                          </p:stCondLst>
+                                        </p:cTn>
+                                        <p:tgtEl>
+                                          <p:spTgt spid="3">
+                                            <p:txEl>
+                                              <p:pRg st="5" end="5"/>
+                                            </p:txEl>
+                                          </p:spTgt>
+                                        </p:tgtEl>
+                                        <p:attrNameLst>
+                                          <p:attrName>style.visibility</p:attrName>
+                                        </p:attrNameLst>
+                                      </p:cBhvr>
+                                      <p:to>
+                                        <p:strVal val="visible"/>
+                                      </p:to>
+                                    </p:set>
+                                  </p:childTnLst>
+                                </p:cTn>
+                              </p:par>
                             </p:childTnLst>
                           </p:cTn>
                         </p:par>
@@ -4922,7 +5390,7 @@
           <a:lstStyle/>
           <a:p>
             <a:r>
-              <a:rPr lang="en-US" dirty="0"/>
+              <a:rPr lang="en-US" b="1" dirty="0"/>
               <a:t>SOLID design principles</a:t>
             </a:r>
           </a:p>
@@ -4960,14 +5428,14 @@
             <a:pPr lvl="1"/>
             <a:r>
               <a:rPr lang="en-US" dirty="0"/>
-              <a:t>Single-responsibility principle</a:t>
+              <a:t>Single-responsibility principle (SRP)</a:t>
             </a:r>
           </a:p>
           <a:p>
             <a:pPr lvl="1"/>
             <a:r>
               <a:rPr lang="en-US" dirty="0"/>
-              <a:t>Open–closed principle</a:t>
+              <a:t>Open–closed principle (OCP)</a:t>
             </a:r>
           </a:p>
           <a:p>
@@ -4978,21 +5446,21 @@
             </a:r>
             <a:r>
               <a:rPr lang="en-US" dirty="0"/>
-              <a:t> substitution principle</a:t>
+              <a:t> substitution principle (LSP)</a:t>
             </a:r>
           </a:p>
           <a:p>
             <a:pPr lvl="1"/>
             <a:r>
               <a:rPr lang="en-US" dirty="0"/>
-              <a:t>Interface segregation principle</a:t>
+              <a:t>Interface segregation principle (ISP)</a:t>
             </a:r>
           </a:p>
           <a:p>
             <a:pPr lvl="1"/>
             <a:r>
               <a:rPr lang="en-US" dirty="0"/>
-              <a:t>Dependency inversion principle</a:t>
+              <a:t>Dependency inversion principle (DIP)</a:t>
             </a:r>
           </a:p>
           <a:p>
@@ -5024,13 +5492,13 @@
   <p:clrMapOvr>
     <a:masterClrMapping/>
   </p:clrMapOvr>
-  <mc:AlternateContent xmlns:mc="http://schemas.openxmlformats.org/markup-compatibility/2006">
-    <mc:Choice xmlns:p14="http://schemas.microsoft.com/office/powerpoint/2010/main" Requires="p14">
+  <mc:AlternateContent xmlns:mc="http://schemas.openxmlformats.org/markup-compatibility/2006" xmlns:p14="http://schemas.microsoft.com/office/powerpoint/2010/main">
+    <mc:Choice Requires="p14">
       <p:transition spd="med" p14:dur="700">
         <p:fade/>
       </p:transition>
     </mc:Choice>
-    <mc:Fallback>
+    <mc:Fallback xmlns="">
       <p:transition spd="med">
         <p:fade/>
       </p:transition>
@@ -5364,7 +5832,496 @@
           <a:lstStyle/>
           <a:p>
             <a:r>
+              <a:rPr lang="en-US" b="1" dirty="0"/>
+              <a:t>Cohesion and coupling</a:t>
+            </a:r>
+          </a:p>
+        </p:txBody>
+      </p:sp>
+      <p:sp>
+        <p:nvSpPr>
+          <p:cNvPr id="3" name="Content Placeholder 2">
+            <a:extLst>
+              <a:ext uri="{FF2B5EF4-FFF2-40B4-BE49-F238E27FC236}">
+                <a16:creationId xmlns:a16="http://schemas.microsoft.com/office/drawing/2014/main" id="{8C64B73B-45A9-0D43-A26E-22CE28C959FF}"/>
+              </a:ext>
+            </a:extLst>
+          </p:cNvPr>
+          <p:cNvSpPr>
+            <a:spLocks noGrp="1"/>
+          </p:cNvSpPr>
+          <p:nvPr>
+            <p:ph idx="1"/>
+          </p:nvPr>
+        </p:nvSpPr>
+        <p:spPr/>
+        <p:txBody>
+          <a:bodyPr>
+            <a:normAutofit/>
+          </a:bodyPr>
+          <a:lstStyle/>
+          <a:p>
+            <a:r>
+              <a:rPr lang="en-US" b="1" dirty="0"/>
+              <a:t>Cohesion</a:t>
+            </a:r>
+            <a:r>
               <a:rPr lang="en-US" dirty="0"/>
+              <a:t> is concerned with the </a:t>
+            </a:r>
+            <a:r>
+              <a:rPr lang="en-US" b="1" dirty="0"/>
+              <a:t>relationships within a module</a:t>
+            </a:r>
+            <a:r>
+              <a:rPr lang="en-US" dirty="0"/>
+              <a:t>.</a:t>
+            </a:r>
+          </a:p>
+          <a:p>
+            <a:pPr lvl="1"/>
+            <a:r>
+              <a:rPr lang="en-US" dirty="0"/>
+              <a:t>The degree to which a part of a code base forms a logically single, atomic unit.</a:t>
+            </a:r>
+          </a:p>
+          <a:p>
+            <a:pPr lvl="1"/>
+            <a:r>
+              <a:rPr lang="en-US" dirty="0"/>
+              <a:t>High cohesion is when parts of a module are highly related to one another.</a:t>
+            </a:r>
+          </a:p>
+          <a:p>
+            <a:pPr lvl="1"/>
+            <a:r>
+              <a:rPr lang="en-US" dirty="0"/>
+              <a:t>Favor high cohesion.</a:t>
+            </a:r>
+          </a:p>
+          <a:p>
+            <a:r>
+              <a:rPr lang="en-US" b="1" dirty="0"/>
+              <a:t>Coupling</a:t>
+            </a:r>
+            <a:r>
+              <a:rPr lang="en-US" dirty="0"/>
+              <a:t> is concerned with the </a:t>
+            </a:r>
+            <a:r>
+              <a:rPr lang="en-US" b="1" dirty="0"/>
+              <a:t>relationships between modules</a:t>
+            </a:r>
+            <a:r>
+              <a:rPr lang="en-US" dirty="0"/>
+              <a:t>.</a:t>
+            </a:r>
+          </a:p>
+          <a:p>
+            <a:pPr lvl="1"/>
+            <a:r>
+              <a:rPr lang="en-US" dirty="0"/>
+              <a:t>The degree to which a single unit is independent from other units.</a:t>
+            </a:r>
+          </a:p>
+          <a:p>
+            <a:pPr lvl="1"/>
+            <a:r>
+              <a:rPr lang="en-US" dirty="0"/>
+              <a:t>The fewer relationships between modules, the lower the coupling.</a:t>
+            </a:r>
+          </a:p>
+          <a:p>
+            <a:pPr lvl="1"/>
+            <a:r>
+              <a:rPr lang="en-US" dirty="0"/>
+              <a:t>Favor low coupling.</a:t>
+            </a:r>
+          </a:p>
+        </p:txBody>
+      </p:sp>
+    </p:spTree>
+    <p:extLst>
+      <p:ext uri="{BB962C8B-B14F-4D97-AF65-F5344CB8AC3E}">
+        <p14:creationId xmlns:p14="http://schemas.microsoft.com/office/powerpoint/2010/main" val="4183041887"/>
+      </p:ext>
+    </p:extLst>
+  </p:cSld>
+  <p:clrMapOvr>
+    <a:masterClrMapping/>
+  </p:clrMapOvr>
+  <mc:AlternateContent xmlns:mc="http://schemas.openxmlformats.org/markup-compatibility/2006" xmlns:p14="http://schemas.microsoft.com/office/powerpoint/2010/main">
+    <mc:Choice Requires="p14">
+      <p:transition spd="med" p14:dur="700">
+        <p:fade/>
+      </p:transition>
+    </mc:Choice>
+    <mc:Fallback xmlns="">
+      <p:transition spd="med">
+        <p:fade/>
+      </p:transition>
+    </mc:Fallback>
+  </mc:AlternateContent>
+  <p:timing>
+    <p:tnLst>
+      <p:par>
+        <p:cTn id="1" dur="indefinite" restart="never" nodeType="tmRoot">
+          <p:childTnLst>
+            <p:seq concurrent="1" nextAc="seek">
+              <p:cTn id="2" dur="indefinite" nodeType="mainSeq">
+                <p:childTnLst>
+                  <p:par>
+                    <p:cTn id="3" fill="hold">
+                      <p:stCondLst>
+                        <p:cond delay="indefinite"/>
+                      </p:stCondLst>
+                      <p:childTnLst>
+                        <p:par>
+                          <p:cTn id="4" fill="hold">
+                            <p:stCondLst>
+                              <p:cond delay="0"/>
+                            </p:stCondLst>
+                            <p:childTnLst>
+                              <p:par>
+                                <p:cTn id="5" presetID="1" presetClass="entr" presetSubtype="0" fill="hold" grpId="0" nodeType="clickEffect">
+                                  <p:stCondLst>
+                                    <p:cond delay="0"/>
+                                  </p:stCondLst>
+                                  <p:childTnLst>
+                                    <p:set>
+                                      <p:cBhvr>
+                                        <p:cTn id="6" dur="1" fill="hold">
+                                          <p:stCondLst>
+                                            <p:cond delay="0"/>
+                                          </p:stCondLst>
+                                        </p:cTn>
+                                        <p:tgtEl>
+                                          <p:spTgt spid="3">
+                                            <p:txEl>
+                                              <p:pRg st="0" end="0"/>
+                                            </p:txEl>
+                                          </p:spTgt>
+                                        </p:tgtEl>
+                                        <p:attrNameLst>
+                                          <p:attrName>style.visibility</p:attrName>
+                                        </p:attrNameLst>
+                                      </p:cBhvr>
+                                      <p:to>
+                                        <p:strVal val="visible"/>
+                                      </p:to>
+                                    </p:set>
+                                  </p:childTnLst>
+                                </p:cTn>
+                              </p:par>
+                              <p:par>
+                                <p:cTn id="7" presetID="1" presetClass="entr" presetSubtype="0" fill="hold" grpId="0" nodeType="withEffect">
+                                  <p:stCondLst>
+                                    <p:cond delay="0"/>
+                                  </p:stCondLst>
+                                  <p:childTnLst>
+                                    <p:set>
+                                      <p:cBhvr>
+                                        <p:cTn id="8" dur="1" fill="hold">
+                                          <p:stCondLst>
+                                            <p:cond delay="0"/>
+                                          </p:stCondLst>
+                                        </p:cTn>
+                                        <p:tgtEl>
+                                          <p:spTgt spid="3">
+                                            <p:txEl>
+                                              <p:pRg st="1" end="1"/>
+                                            </p:txEl>
+                                          </p:spTgt>
+                                        </p:tgtEl>
+                                        <p:attrNameLst>
+                                          <p:attrName>style.visibility</p:attrName>
+                                        </p:attrNameLst>
+                                      </p:cBhvr>
+                                      <p:to>
+                                        <p:strVal val="visible"/>
+                                      </p:to>
+                                    </p:set>
+                                  </p:childTnLst>
+                                </p:cTn>
+                              </p:par>
+                              <p:par>
+                                <p:cTn id="9" presetID="1" presetClass="entr" presetSubtype="0" fill="hold" grpId="0" nodeType="withEffect">
+                                  <p:stCondLst>
+                                    <p:cond delay="0"/>
+                                  </p:stCondLst>
+                                  <p:childTnLst>
+                                    <p:set>
+                                      <p:cBhvr>
+                                        <p:cTn id="10" dur="1" fill="hold">
+                                          <p:stCondLst>
+                                            <p:cond delay="0"/>
+                                          </p:stCondLst>
+                                        </p:cTn>
+                                        <p:tgtEl>
+                                          <p:spTgt spid="3">
+                                            <p:txEl>
+                                              <p:pRg st="2" end="2"/>
+                                            </p:txEl>
+                                          </p:spTgt>
+                                        </p:tgtEl>
+                                        <p:attrNameLst>
+                                          <p:attrName>style.visibility</p:attrName>
+                                        </p:attrNameLst>
+                                      </p:cBhvr>
+                                      <p:to>
+                                        <p:strVal val="visible"/>
+                                      </p:to>
+                                    </p:set>
+                                  </p:childTnLst>
+                                </p:cTn>
+                              </p:par>
+                              <p:par>
+                                <p:cTn id="11" presetID="1" presetClass="entr" presetSubtype="0" fill="hold" grpId="0" nodeType="withEffect">
+                                  <p:stCondLst>
+                                    <p:cond delay="0"/>
+                                  </p:stCondLst>
+                                  <p:childTnLst>
+                                    <p:set>
+                                      <p:cBhvr>
+                                        <p:cTn id="12" dur="1" fill="hold">
+                                          <p:stCondLst>
+                                            <p:cond delay="0"/>
+                                          </p:stCondLst>
+                                        </p:cTn>
+                                        <p:tgtEl>
+                                          <p:spTgt spid="3">
+                                            <p:txEl>
+                                              <p:pRg st="3" end="3"/>
+                                            </p:txEl>
+                                          </p:spTgt>
+                                        </p:tgtEl>
+                                        <p:attrNameLst>
+                                          <p:attrName>style.visibility</p:attrName>
+                                        </p:attrNameLst>
+                                      </p:cBhvr>
+                                      <p:to>
+                                        <p:strVal val="visible"/>
+                                      </p:to>
+                                    </p:set>
+                                  </p:childTnLst>
+                                </p:cTn>
+                              </p:par>
+                            </p:childTnLst>
+                          </p:cTn>
+                        </p:par>
+                      </p:childTnLst>
+                    </p:cTn>
+                  </p:par>
+                  <p:par>
+                    <p:cTn id="13" fill="hold">
+                      <p:stCondLst>
+                        <p:cond delay="indefinite"/>
+                      </p:stCondLst>
+                      <p:childTnLst>
+                        <p:par>
+                          <p:cTn id="14" fill="hold">
+                            <p:stCondLst>
+                              <p:cond delay="0"/>
+                            </p:stCondLst>
+                            <p:childTnLst>
+                              <p:par>
+                                <p:cTn id="15" presetID="1" presetClass="entr" presetSubtype="0" fill="hold" grpId="0" nodeType="clickEffect">
+                                  <p:stCondLst>
+                                    <p:cond delay="0"/>
+                                  </p:stCondLst>
+                                  <p:childTnLst>
+                                    <p:set>
+                                      <p:cBhvr>
+                                        <p:cTn id="16" dur="1" fill="hold">
+                                          <p:stCondLst>
+                                            <p:cond delay="0"/>
+                                          </p:stCondLst>
+                                        </p:cTn>
+                                        <p:tgtEl>
+                                          <p:spTgt spid="3">
+                                            <p:txEl>
+                                              <p:pRg st="4" end="4"/>
+                                            </p:txEl>
+                                          </p:spTgt>
+                                        </p:tgtEl>
+                                        <p:attrNameLst>
+                                          <p:attrName>style.visibility</p:attrName>
+                                        </p:attrNameLst>
+                                      </p:cBhvr>
+                                      <p:to>
+                                        <p:strVal val="visible"/>
+                                      </p:to>
+                                    </p:set>
+                                  </p:childTnLst>
+                                </p:cTn>
+                              </p:par>
+                              <p:par>
+                                <p:cTn id="17" presetID="1" presetClass="entr" presetSubtype="0" fill="hold" grpId="0" nodeType="withEffect">
+                                  <p:stCondLst>
+                                    <p:cond delay="0"/>
+                                  </p:stCondLst>
+                                  <p:childTnLst>
+                                    <p:set>
+                                      <p:cBhvr>
+                                        <p:cTn id="18" dur="1" fill="hold">
+                                          <p:stCondLst>
+                                            <p:cond delay="0"/>
+                                          </p:stCondLst>
+                                        </p:cTn>
+                                        <p:tgtEl>
+                                          <p:spTgt spid="3">
+                                            <p:txEl>
+                                              <p:pRg st="5" end="5"/>
+                                            </p:txEl>
+                                          </p:spTgt>
+                                        </p:tgtEl>
+                                        <p:attrNameLst>
+                                          <p:attrName>style.visibility</p:attrName>
+                                        </p:attrNameLst>
+                                      </p:cBhvr>
+                                      <p:to>
+                                        <p:strVal val="visible"/>
+                                      </p:to>
+                                    </p:set>
+                                  </p:childTnLst>
+                                </p:cTn>
+                              </p:par>
+                              <p:par>
+                                <p:cTn id="19" presetID="1" presetClass="entr" presetSubtype="0" fill="hold" grpId="0" nodeType="withEffect">
+                                  <p:stCondLst>
+                                    <p:cond delay="0"/>
+                                  </p:stCondLst>
+                                  <p:childTnLst>
+                                    <p:set>
+                                      <p:cBhvr>
+                                        <p:cTn id="20" dur="1" fill="hold">
+                                          <p:stCondLst>
+                                            <p:cond delay="0"/>
+                                          </p:stCondLst>
+                                        </p:cTn>
+                                        <p:tgtEl>
+                                          <p:spTgt spid="3">
+                                            <p:txEl>
+                                              <p:pRg st="6" end="6"/>
+                                            </p:txEl>
+                                          </p:spTgt>
+                                        </p:tgtEl>
+                                        <p:attrNameLst>
+                                          <p:attrName>style.visibility</p:attrName>
+                                        </p:attrNameLst>
+                                      </p:cBhvr>
+                                      <p:to>
+                                        <p:strVal val="visible"/>
+                                      </p:to>
+                                    </p:set>
+                                  </p:childTnLst>
+                                </p:cTn>
+                              </p:par>
+                              <p:par>
+                                <p:cTn id="21" presetID="1" presetClass="entr" presetSubtype="0" fill="hold" grpId="0" nodeType="withEffect">
+                                  <p:stCondLst>
+                                    <p:cond delay="0"/>
+                                  </p:stCondLst>
+                                  <p:childTnLst>
+                                    <p:set>
+                                      <p:cBhvr>
+                                        <p:cTn id="22" dur="1" fill="hold">
+                                          <p:stCondLst>
+                                            <p:cond delay="0"/>
+                                          </p:stCondLst>
+                                        </p:cTn>
+                                        <p:tgtEl>
+                                          <p:spTgt spid="3">
+                                            <p:txEl>
+                                              <p:pRg st="7" end="7"/>
+                                            </p:txEl>
+                                          </p:spTgt>
+                                        </p:tgtEl>
+                                        <p:attrNameLst>
+                                          <p:attrName>style.visibility</p:attrName>
+                                        </p:attrNameLst>
+                                      </p:cBhvr>
+                                      <p:to>
+                                        <p:strVal val="visible"/>
+                                      </p:to>
+                                    </p:set>
+                                  </p:childTnLst>
+                                </p:cTn>
+                              </p:par>
+                            </p:childTnLst>
+                          </p:cTn>
+                        </p:par>
+                      </p:childTnLst>
+                    </p:cTn>
+                  </p:par>
+                </p:childTnLst>
+              </p:cTn>
+              <p:prevCondLst>
+                <p:cond evt="onPrev" delay="0">
+                  <p:tgtEl>
+                    <p:sldTgt/>
+                  </p:tgtEl>
+                </p:cond>
+              </p:prevCondLst>
+              <p:nextCondLst>
+                <p:cond evt="onNext" delay="0">
+                  <p:tgtEl>
+                    <p:sldTgt/>
+                  </p:tgtEl>
+                </p:cond>
+              </p:nextCondLst>
+            </p:seq>
+          </p:childTnLst>
+        </p:cTn>
+      </p:par>
+    </p:tnLst>
+    <p:bldLst>
+      <p:bldP spid="3" grpId="0" build="p"/>
+    </p:bldLst>
+  </p:timing>
+</p:sld>
+</file>
+
+<file path=ppt/slides/slide4.xml><?xml version="1.0" encoding="utf-8"?>
+<p:sld xmlns:a="http://schemas.openxmlformats.org/drawingml/2006/main" xmlns:r="http://schemas.openxmlformats.org/officeDocument/2006/relationships" xmlns:p="http://schemas.openxmlformats.org/presentationml/2006/main">
+  <p:cSld>
+    <p:spTree>
+      <p:nvGrpSpPr>
+        <p:cNvPr id="1" name=""/>
+        <p:cNvGrpSpPr/>
+        <p:nvPr/>
+      </p:nvGrpSpPr>
+      <p:grpSpPr>
+        <a:xfrm>
+          <a:off x="0" y="0"/>
+          <a:ext cx="0" cy="0"/>
+          <a:chOff x="0" y="0"/>
+          <a:chExt cx="0" cy="0"/>
+        </a:xfrm>
+      </p:grpSpPr>
+      <p:sp>
+        <p:nvSpPr>
+          <p:cNvPr id="2" name="Title 1">
+            <a:extLst>
+              <a:ext uri="{FF2B5EF4-FFF2-40B4-BE49-F238E27FC236}">
+                <a16:creationId xmlns:a16="http://schemas.microsoft.com/office/drawing/2014/main" id="{B6695F51-BDF2-9B42-88BF-7E11C919BE9B}"/>
+              </a:ext>
+            </a:extLst>
+          </p:cNvPr>
+          <p:cNvSpPr>
+            <a:spLocks noGrp="1"/>
+          </p:cNvSpPr>
+          <p:nvPr>
+            <p:ph type="title"/>
+          </p:nvPr>
+        </p:nvSpPr>
+        <p:spPr/>
+        <p:txBody>
+          <a:bodyPr/>
+          <a:lstStyle/>
+          <a:p>
+            <a:r>
+              <a:rPr lang="en-US" b="1" dirty="0"/>
               <a:t>Single Responsibility Principle (SRP)</a:t>
             </a:r>
           </a:p>
@@ -5413,6 +6370,13 @@
             <a:pPr lvl="1"/>
             <a:r>
               <a:rPr lang="en-US" dirty="0"/>
+              <a:t>Big classes typically have low cohesion</a:t>
+            </a:r>
+          </a:p>
+          <a:p>
+            <a:pPr lvl="1"/>
+            <a:r>
+              <a:rPr lang="en-US" dirty="0"/>
               <a:t>Use object composition and delegation to build up functionality.</a:t>
             </a:r>
           </a:p>
@@ -5431,7 +6395,7 @@
           <a:p>
             <a:r>
               <a:rPr lang="en-US" dirty="0"/>
-              <a:t>This principle will be used a lot in our efforts to improve the test coverage of our codebases.</a:t>
+              <a:t>Promotes high cohesion, low coupling</a:t>
             </a:r>
           </a:p>
           <a:p>
@@ -5442,7 +6406,7 @@
     </p:spTree>
     <p:extLst>
       <p:ext uri="{BB962C8B-B14F-4D97-AF65-F5344CB8AC3E}">
-        <p14:creationId xmlns:p14="http://schemas.microsoft.com/office/powerpoint/2010/main" val="4183041887"/>
+        <p14:creationId xmlns:p14="http://schemas.microsoft.com/office/powerpoint/2010/main" val="3359360260"/>
       </p:ext>
     </p:extLst>
   </p:cSld>
@@ -5623,33 +6587,15 @@
                                   </p:childTnLst>
                                 </p:cTn>
                               </p:par>
-                            </p:childTnLst>
-                          </p:cTn>
-                        </p:par>
-                      </p:childTnLst>
-                    </p:cTn>
-                  </p:par>
-                  <p:par>
-                    <p:cTn id="15" fill="hold">
-                      <p:stCondLst>
-                        <p:cond delay="indefinite"/>
-                      </p:stCondLst>
-                      <p:childTnLst>
-                        <p:par>
-                          <p:cTn id="16" fill="hold">
-                            <p:stCondLst>
-                              <p:cond delay="0"/>
-                            </p:stCondLst>
-                            <p:childTnLst>
                               <p:par>
-                                <p:cTn id="17" presetID="1" presetClass="entr" presetSubtype="0" fill="hold" grpId="0" nodeType="clickEffect">
+                                <p:cTn id="15" presetID="1" presetClass="entr" presetSubtype="0" fill="hold" grpId="0" nodeType="withEffect">
                                   <p:stCondLst>
                                     <p:cond delay="0"/>
                                   </p:stCondLst>
                                   <p:childTnLst>
                                     <p:set>
                                       <p:cBhvr>
-                                        <p:cTn id="18" dur="1" fill="hold">
+                                        <p:cTn id="16" dur="1" fill="hold">
                                           <p:stCondLst>
                                             <p:cond delay="0"/>
                                           </p:stCondLst>
@@ -5679,26 +6625,26 @@
                     </p:cTn>
                   </p:par>
                   <p:par>
-                    <p:cTn id="19" fill="hold">
+                    <p:cTn id="17" fill="hold">
                       <p:stCondLst>
                         <p:cond delay="indefinite"/>
                       </p:stCondLst>
                       <p:childTnLst>
                         <p:par>
-                          <p:cTn id="20" fill="hold">
+                          <p:cTn id="18" fill="hold">
                             <p:stCondLst>
                               <p:cond delay="0"/>
                             </p:stCondLst>
                             <p:childTnLst>
                               <p:par>
-                                <p:cTn id="21" presetID="1" presetClass="entr" presetSubtype="0" fill="hold" grpId="0" nodeType="clickEffect">
+                                <p:cTn id="19" presetID="1" presetClass="entr" presetSubtype="0" fill="hold" grpId="0" nodeType="clickEffect">
                                   <p:stCondLst>
                                     <p:cond delay="0"/>
                                   </p:stCondLst>
                                   <p:childTnLst>
                                     <p:set>
                                       <p:cBhvr>
-                                        <p:cTn id="22" dur="1" fill="hold">
+                                        <p:cTn id="20" dur="1" fill="hold">
                                           <p:stCondLst>
                                             <p:cond delay="0"/>
                                           </p:stCondLst>
@@ -5728,26 +6674,26 @@
                     </p:cTn>
                   </p:par>
                   <p:par>
-                    <p:cTn id="23" fill="hold">
+                    <p:cTn id="21" fill="hold">
                       <p:stCondLst>
                         <p:cond delay="indefinite"/>
                       </p:stCondLst>
                       <p:childTnLst>
                         <p:par>
-                          <p:cTn id="24" fill="hold">
+                          <p:cTn id="22" fill="hold">
                             <p:stCondLst>
                               <p:cond delay="0"/>
                             </p:stCondLst>
                             <p:childTnLst>
                               <p:par>
-                                <p:cTn id="25" presetID="1" presetClass="entr" presetSubtype="0" fill="hold" grpId="0" nodeType="clickEffect">
+                                <p:cTn id="23" presetID="1" presetClass="entr" presetSubtype="0" fill="hold" grpId="0" nodeType="clickEffect">
                                   <p:stCondLst>
                                     <p:cond delay="0"/>
                                   </p:stCondLst>
                                   <p:childTnLst>
                                     <p:set>
                                       <p:cBhvr>
-                                        <p:cTn id="26" dur="1" fill="hold">
+                                        <p:cTn id="24" dur="1" fill="hold">
                                           <p:stCondLst>
                                             <p:cond delay="0"/>
                                           </p:stCondLst>
@@ -5756,6 +6702,55 @@
                                           <p:spTgt spid="3">
                                             <p:txEl>
                                               <p:pRg st="6" end="6"/>
+                                            </p:txEl>
+                                          </p:spTgt>
+                                        </p:tgtEl>
+                                        <p:attrNameLst>
+                                          <p:attrName>style.visibility</p:attrName>
+                                        </p:attrNameLst>
+                                      </p:cBhvr>
+                                      <p:to>
+                                        <p:strVal val="visible"/>
+                                      </p:to>
+                                    </p:set>
+                                  </p:childTnLst>
+                                </p:cTn>
+                              </p:par>
+                            </p:childTnLst>
+                          </p:cTn>
+                        </p:par>
+                      </p:childTnLst>
+                    </p:cTn>
+                  </p:par>
+                  <p:par>
+                    <p:cTn id="25" fill="hold">
+                      <p:stCondLst>
+                        <p:cond delay="indefinite"/>
+                      </p:stCondLst>
+                      <p:childTnLst>
+                        <p:par>
+                          <p:cTn id="26" fill="hold">
+                            <p:stCondLst>
+                              <p:cond delay="0"/>
+                            </p:stCondLst>
+                            <p:childTnLst>
+                              <p:par>
+                                <p:cTn id="27" presetID="1" presetClass="entr" presetSubtype="0" fill="hold" grpId="0" nodeType="clickEffect">
+                                  <p:stCondLst>
+                                    <p:cond delay="0"/>
+                                  </p:stCondLst>
+                                  <p:childTnLst>
+                                    <p:set>
+                                      <p:cBhvr>
+                                        <p:cTn id="28" dur="1" fill="hold">
+                                          <p:stCondLst>
+                                            <p:cond delay="0"/>
+                                          </p:stCondLst>
+                                        </p:cTn>
+                                        <p:tgtEl>
+                                          <p:spTgt spid="3">
+                                            <p:txEl>
+                                              <p:pRg st="7" end="7"/>
                                             </p:txEl>
                                           </p:spTgt>
                                         </p:tgtEl>
@@ -5804,7 +6799,7 @@
 </p:sld>
 </file>
 
-<file path=ppt/slides/slide4.xml><?xml version="1.0" encoding="utf-8"?>
+<file path=ppt/slides/slide5.xml><?xml version="1.0" encoding="utf-8"?>
 <p:sld xmlns:a="http://schemas.openxmlformats.org/drawingml/2006/main" xmlns:r="http://schemas.openxmlformats.org/officeDocument/2006/relationships" xmlns:p="http://schemas.openxmlformats.org/presentationml/2006/main">
   <p:cSld>
     <p:spTree>
@@ -5843,7 +6838,7 @@
           <a:lstStyle/>
           <a:p>
             <a:r>
-              <a:rPr lang="en-US" dirty="0"/>
+              <a:rPr lang="en-US" b="1" dirty="0"/>
               <a:t>Benefits: Single Responsibility Principle</a:t>
             </a:r>
           </a:p>
@@ -5904,7 +6899,7 @@
           <a:p>
             <a:r>
               <a:rPr lang="en-US" dirty="0"/>
-              <a:t>When describing what something does, watch out for “and”  and “or”.</a:t>
+              <a:t>When describing what something does, watch out for “and” and “or”.</a:t>
             </a:r>
           </a:p>
         </p:txBody>
@@ -5919,13 +6914,13 @@
   <p:clrMapOvr>
     <a:masterClrMapping/>
   </p:clrMapOvr>
-  <mc:AlternateContent xmlns:mc="http://schemas.openxmlformats.org/markup-compatibility/2006">
-    <mc:Choice xmlns:p14="http://schemas.microsoft.com/office/powerpoint/2010/main" Requires="p14">
+  <mc:AlternateContent xmlns:mc="http://schemas.openxmlformats.org/markup-compatibility/2006" xmlns:p14="http://schemas.microsoft.com/office/powerpoint/2010/main">
+    <mc:Choice Requires="p14">
       <p:transition spd="med" p14:dur="700">
         <p:fade/>
       </p:transition>
     </mc:Choice>
-    <mc:Fallback>
+    <mc:Fallback xmlns="">
       <p:transition spd="med">
         <p:fade/>
       </p:transition>
@@ -6225,7 +7220,7 @@
 </p:sld>
 </file>
 
-<file path=ppt/slides/slide5.xml><?xml version="1.0" encoding="utf-8"?>
+<file path=ppt/slides/slide6.xml><?xml version="1.0" encoding="utf-8"?>
 <p:sld xmlns:a="http://schemas.openxmlformats.org/drawingml/2006/main" xmlns:r="http://schemas.openxmlformats.org/officeDocument/2006/relationships" xmlns:p="http://schemas.openxmlformats.org/presentationml/2006/main">
   <p:cSld>
     <p:spTree>
@@ -6264,7 +7259,7 @@
           <a:lstStyle/>
           <a:p>
             <a:r>
-              <a:rPr lang="en-US" dirty="0"/>
+              <a:rPr lang="en-US" b="1" dirty="0"/>
               <a:t>Open–Closed Principle (OCP)</a:t>
             </a:r>
           </a:p>
@@ -6306,7 +7301,7 @@
             <a:pPr lvl="1"/>
             <a:r>
               <a:rPr lang="en-US" dirty="0"/>
-              <a:t>When requirements change, you extend the behavior of such classes by adding new code, not by changing old code that already works.</a:t>
+              <a:t>New functionality is typically a new implementation in the form of a concrete class/subclass.</a:t>
             </a:r>
           </a:p>
           <a:p>
@@ -6345,13 +7340,13 @@
   <p:clrMapOvr>
     <a:masterClrMapping/>
   </p:clrMapOvr>
-  <mc:AlternateContent xmlns:mc="http://schemas.openxmlformats.org/markup-compatibility/2006">
-    <mc:Choice xmlns:p14="http://schemas.microsoft.com/office/powerpoint/2010/main" Requires="p14">
+  <mc:AlternateContent xmlns:mc="http://schemas.openxmlformats.org/markup-compatibility/2006" xmlns:p14="http://schemas.microsoft.com/office/powerpoint/2010/main">
+    <mc:Choice Requires="p14">
       <p:transition spd="med" p14:dur="700">
         <p:fade/>
       </p:transition>
     </mc:Choice>
-    <mc:Fallback>
+    <mc:Fallback xmlns="">
       <p:transition spd="med">
         <p:fade/>
       </p:transition>
@@ -6602,7 +7597,7 @@
 </p:sld>
 </file>
 
-<file path=ppt/slides/slide6.xml><?xml version="1.0" encoding="utf-8"?>
+<file path=ppt/slides/slide7.xml><?xml version="1.0" encoding="utf-8"?>
 <p:sld xmlns:a="http://schemas.openxmlformats.org/drawingml/2006/main" xmlns:r="http://schemas.openxmlformats.org/officeDocument/2006/relationships" xmlns:p="http://schemas.openxmlformats.org/presentationml/2006/main">
   <p:cSld>
     <p:spTree>
@@ -6641,7 +7636,7 @@
           <a:lstStyle/>
           <a:p>
             <a:r>
-              <a:rPr lang="en-US" dirty="0"/>
+              <a:rPr lang="en-US" b="1" dirty="0"/>
               <a:t>Benefits: Open-Closed Principle</a:t>
             </a:r>
           </a:p>
@@ -6732,13 +7727,13 @@
   <p:clrMapOvr>
     <a:masterClrMapping/>
   </p:clrMapOvr>
-  <mc:AlternateContent xmlns:mc="http://schemas.openxmlformats.org/markup-compatibility/2006">
-    <mc:Choice xmlns:p14="http://schemas.microsoft.com/office/powerpoint/2010/main" Requires="p14">
+  <mc:AlternateContent xmlns:mc="http://schemas.openxmlformats.org/markup-compatibility/2006" xmlns:p14="http://schemas.microsoft.com/office/powerpoint/2010/main">
+    <mc:Choice Requires="p14">
       <p:transition spd="med" p14:dur="700">
         <p:fade/>
       </p:transition>
     </mc:Choice>
-    <mc:Fallback>
+    <mc:Fallback xmlns="">
       <p:transition spd="med">
         <p:fade/>
       </p:transition>
@@ -7082,7 +8077,7 @@
 </p:sld>
 </file>
 
-<file path=ppt/slides/slide7.xml><?xml version="1.0" encoding="utf-8"?>
+<file path=ppt/slides/slide8.xml><?xml version="1.0" encoding="utf-8"?>
 <p:sld xmlns:a="http://schemas.openxmlformats.org/drawingml/2006/main" xmlns:r="http://schemas.openxmlformats.org/officeDocument/2006/relationships" xmlns:p="http://schemas.openxmlformats.org/presentationml/2006/main">
   <p:cSld>
     <p:spTree>
@@ -7121,11 +8116,11 @@
           <a:lstStyle/>
           <a:p>
             <a:r>
-              <a:rPr lang="en-US" dirty="0" err="1"/>
+              <a:rPr lang="en-US" b="1" dirty="0" err="1"/>
               <a:t>Liskov</a:t>
             </a:r>
             <a:r>
-              <a:rPr lang="en-US" dirty="0"/>
+              <a:rPr lang="en-US" b="1" dirty="0"/>
               <a:t> Substitution Principle (LSP)</a:t>
             </a:r>
           </a:p>
@@ -7161,15 +8156,7 @@
             <a:pPr lvl="1"/>
             <a:r>
               <a:rPr lang="en-US" dirty="0"/>
-              <a:t>You should be able to substitute a superclass object reference with an object of </a:t>
-            </a:r>
-            <a:r>
-              <a:rPr lang="en-US" i="1" dirty="0"/>
-              <a:t>any</a:t>
-            </a:r>
-            <a:r>
-              <a:rPr lang="en-US" dirty="0"/>
-              <a:t> of its subclasses, the program should not break.</a:t>
+              <a:t>You should be able to substitute any subclass implementation and the functionality should not break.</a:t>
             </a:r>
           </a:p>
           <a:p>
@@ -7206,7 +8193,7 @@
             <a:pPr lvl="1"/>
             <a:r>
               <a:rPr lang="en-US" dirty="0"/>
-              <a:t>Interfaces and abstract base classes are the contract between caller and implementation.</a:t>
+              <a:t>Interfaces and abstract base classes are the contract between the caller and implementation.</a:t>
             </a:r>
           </a:p>
           <a:p>
@@ -7224,13 +8211,13 @@
   <p:clrMapOvr>
     <a:masterClrMapping/>
   </p:clrMapOvr>
-  <mc:AlternateContent xmlns:mc="http://schemas.openxmlformats.org/markup-compatibility/2006">
-    <mc:Choice xmlns:p14="http://schemas.microsoft.com/office/powerpoint/2010/main" Requires="p14">
+  <mc:AlternateContent xmlns:mc="http://schemas.openxmlformats.org/markup-compatibility/2006" xmlns:p14="http://schemas.microsoft.com/office/powerpoint/2010/main">
+    <mc:Choice Requires="p14">
       <p:transition spd="med" p14:dur="700">
         <p:fade/>
       </p:transition>
     </mc:Choice>
-    <mc:Fallback>
+    <mc:Fallback xmlns="">
       <p:transition spd="med">
         <p:fade/>
       </p:transition>
@@ -7543,7 +8530,7 @@
 </p:sld>
 </file>
 
-<file path=ppt/slides/slide8.xml><?xml version="1.0" encoding="utf-8"?>
+<file path=ppt/slides/slide9.xml><?xml version="1.0" encoding="utf-8"?>
 <p:sld xmlns:a="http://schemas.openxmlformats.org/drawingml/2006/main" xmlns:r="http://schemas.openxmlformats.org/officeDocument/2006/relationships" xmlns:p="http://schemas.openxmlformats.org/presentationml/2006/main">
   <p:cSld>
     <p:spTree>
@@ -7582,18 +8569,17 @@
           <a:lstStyle/>
           <a:p>
             <a:r>
-              <a:rPr lang="en-US" dirty="0"/>
+              <a:rPr lang="en-US" b="1" dirty="0"/>
               <a:t>Benefits: </a:t>
             </a:r>
             <a:r>
-              <a:rPr lang="en-US" dirty="0" err="1"/>
+              <a:rPr lang="en-US" b="1" dirty="0" err="1"/>
               <a:t>Liskov</a:t>
             </a:r>
             <a:r>
-              <a:rPr lang="en-US" dirty="0"/>
+              <a:rPr lang="en-US" b="1" dirty="0"/>
               <a:t> Substitution Principle</a:t>
             </a:r>
-            <a:endParaRPr lang="en-US" b="1" dirty="0"/>
           </a:p>
         </p:txBody>
       </p:sp>
@@ -7634,7 +8620,7 @@
             <a:pPr lvl="1"/>
             <a:r>
               <a:rPr lang="en-US" dirty="0"/>
-              <a:t>Implementations are typically injected at runtime via constructor injection or as parameters to methods.</a:t>
+              <a:t>Implementations are typically injected at runtime via parameter injection.</a:t>
             </a:r>
           </a:p>
           <a:p>
@@ -7661,7 +8647,14 @@
             <a:pPr lvl="1"/>
             <a:r>
               <a:rPr lang="en-US" dirty="0"/>
-              <a:t>Watch out for no-op interface implementations. This is a code smell telling you your type hierarchy design is suspect.</a:t>
+              <a:t>Watch out for no-op interface implementations. </a:t>
+            </a:r>
+          </a:p>
+          <a:p>
+            <a:pPr lvl="2"/>
+            <a:r>
+              <a:rPr lang="en-US" dirty="0"/>
+              <a:t>This is a code smell telling you your type hierarchy design is suspect.</a:t>
             </a:r>
           </a:p>
           <a:p>
@@ -7687,13 +8680,13 @@
   <p:clrMapOvr>
     <a:masterClrMapping/>
   </p:clrMapOvr>
-  <mc:AlternateContent xmlns:mc="http://schemas.openxmlformats.org/markup-compatibility/2006">
-    <mc:Choice xmlns:p14="http://schemas.microsoft.com/office/powerpoint/2010/main" Requires="p14">
+  <mc:AlternateContent xmlns:mc="http://schemas.openxmlformats.org/markup-compatibility/2006" xmlns:p14="http://schemas.microsoft.com/office/powerpoint/2010/main">
+    <mc:Choice Requires="p14">
       <p:transition spd="med" p14:dur="700">
         <p:fade/>
       </p:transition>
     </mc:Choice>
-    <mc:Fallback>
+    <mc:Fallback xmlns="">
       <p:transition spd="med">
         <p:fade/>
       </p:transition>
@@ -7985,196 +8978,15 @@
                                   </p:childTnLst>
                                 </p:cTn>
                               </p:par>
-                            </p:childTnLst>
-                          </p:cTn>
-                        </p:par>
-                      </p:childTnLst>
-                    </p:cTn>
-                  </p:par>
-                </p:childTnLst>
-              </p:cTn>
-              <p:prevCondLst>
-                <p:cond evt="onPrev" delay="0">
-                  <p:tgtEl>
-                    <p:sldTgt/>
-                  </p:tgtEl>
-                </p:cond>
-              </p:prevCondLst>
-              <p:nextCondLst>
-                <p:cond evt="onNext" delay="0">
-                  <p:tgtEl>
-                    <p:sldTgt/>
-                  </p:tgtEl>
-                </p:cond>
-              </p:nextCondLst>
-            </p:seq>
-          </p:childTnLst>
-        </p:cTn>
-      </p:par>
-    </p:tnLst>
-    <p:bldLst>
-      <p:bldP spid="3" grpId="0" build="p"/>
-    </p:bldLst>
-  </p:timing>
-</p:sld>
-</file>
-
-<file path=ppt/slides/slide9.xml><?xml version="1.0" encoding="utf-8"?>
-<p:sld xmlns:a="http://schemas.openxmlformats.org/drawingml/2006/main" xmlns:r="http://schemas.openxmlformats.org/officeDocument/2006/relationships" xmlns:p="http://schemas.openxmlformats.org/presentationml/2006/main">
-  <p:cSld>
-    <p:spTree>
-      <p:nvGrpSpPr>
-        <p:cNvPr id="1" name=""/>
-        <p:cNvGrpSpPr/>
-        <p:nvPr/>
-      </p:nvGrpSpPr>
-      <p:grpSpPr>
-        <a:xfrm>
-          <a:off x="0" y="0"/>
-          <a:ext cx="0" cy="0"/>
-          <a:chOff x="0" y="0"/>
-          <a:chExt cx="0" cy="0"/>
-        </a:xfrm>
-      </p:grpSpPr>
-      <p:sp>
-        <p:nvSpPr>
-          <p:cNvPr id="2" name="Title 1">
-            <a:extLst>
-              <a:ext uri="{FF2B5EF4-FFF2-40B4-BE49-F238E27FC236}">
-                <a16:creationId xmlns:a16="http://schemas.microsoft.com/office/drawing/2014/main" id="{B6695F51-BDF2-9B42-88BF-7E11C919BE9B}"/>
-              </a:ext>
-            </a:extLst>
-          </p:cNvPr>
-          <p:cNvSpPr>
-            <a:spLocks noGrp="1"/>
-          </p:cNvSpPr>
-          <p:nvPr>
-            <p:ph type="title"/>
-          </p:nvPr>
-        </p:nvSpPr>
-        <p:spPr/>
-        <p:txBody>
-          <a:bodyPr/>
-          <a:lstStyle/>
-          <a:p>
-            <a:r>
-              <a:rPr lang="en-US" dirty="0"/>
-              <a:t>Interface Segregation Principle (ISP)</a:t>
-            </a:r>
-          </a:p>
-        </p:txBody>
-      </p:sp>
-      <p:sp>
-        <p:nvSpPr>
-          <p:cNvPr id="3" name="Content Placeholder 2">
-            <a:extLst>
-              <a:ext uri="{FF2B5EF4-FFF2-40B4-BE49-F238E27FC236}">
-                <a16:creationId xmlns:a16="http://schemas.microsoft.com/office/drawing/2014/main" id="{8C64B73B-45A9-0D43-A26E-22CE28C959FF}"/>
-              </a:ext>
-            </a:extLst>
-          </p:cNvPr>
-          <p:cNvSpPr>
-            <a:spLocks noGrp="1"/>
-          </p:cNvSpPr>
-          <p:nvPr>
-            <p:ph idx="1"/>
-          </p:nvPr>
-        </p:nvSpPr>
-        <p:spPr/>
-        <p:txBody>
-          <a:bodyPr/>
-          <a:lstStyle/>
-          <a:p>
-            <a:r>
-              <a:rPr lang="en-US" dirty="0"/>
-              <a:t>Many client-specific interfaces are better than one general-purpose interface.</a:t>
-            </a:r>
-          </a:p>
-          <a:p>
-            <a:pPr lvl="1"/>
-            <a:r>
-              <a:rPr lang="en-US" dirty="0"/>
-              <a:t>Avoid the “fat” interface!</a:t>
-            </a:r>
-          </a:p>
-          <a:p>
-            <a:pPr lvl="1"/>
-            <a:r>
-              <a:rPr lang="en-US" dirty="0"/>
-              <a:t>Favor smaller role-based interfaces as opposed to one larger interface that has methods you may not be interested in.</a:t>
-            </a:r>
-          </a:p>
-          <a:p>
-            <a:r>
-              <a:rPr lang="en-US" dirty="0"/>
-              <a:t>Implementations extend multiple role interfaces.</a:t>
-            </a:r>
-          </a:p>
-          <a:p>
-            <a:r>
-              <a:rPr lang="en-US" dirty="0"/>
-              <a:t>Decompose large interfaces into smaller ones based on the role they play in the system.</a:t>
-            </a:r>
-          </a:p>
-          <a:p>
-            <a:r>
-              <a:rPr lang="en-US" dirty="0"/>
-              <a:t>Delegation using the adapter pattern can be helpful here for composing implementations that support multiple role interfaces.</a:t>
-            </a:r>
-          </a:p>
-        </p:txBody>
-      </p:sp>
-    </p:spTree>
-    <p:extLst>
-      <p:ext uri="{BB962C8B-B14F-4D97-AF65-F5344CB8AC3E}">
-        <p14:creationId xmlns:p14="http://schemas.microsoft.com/office/powerpoint/2010/main" val="3745764711"/>
-      </p:ext>
-    </p:extLst>
-  </p:cSld>
-  <p:clrMapOvr>
-    <a:masterClrMapping/>
-  </p:clrMapOvr>
-  <mc:AlternateContent xmlns:mc="http://schemas.openxmlformats.org/markup-compatibility/2006">
-    <mc:Choice xmlns:p14="http://schemas.microsoft.com/office/powerpoint/2010/main" Requires="p14">
-      <p:transition spd="med" p14:dur="700">
-        <p:fade/>
-      </p:transition>
-    </mc:Choice>
-    <mc:Fallback>
-      <p:transition spd="med">
-        <p:fade/>
-      </p:transition>
-    </mc:Fallback>
-  </mc:AlternateContent>
-  <p:timing>
-    <p:tnLst>
-      <p:par>
-        <p:cTn id="1" dur="indefinite" restart="never" nodeType="tmRoot">
-          <p:childTnLst>
-            <p:seq concurrent="1" nextAc="seek">
-              <p:cTn id="2" dur="indefinite" nodeType="mainSeq">
-                <p:childTnLst>
-                  <p:par>
-                    <p:cTn id="3" fill="hold">
-                      <p:stCondLst>
-                        <p:cond delay="indefinite"/>
-                      </p:stCondLst>
-                      <p:childTnLst>
-                        <p:par>
-                          <p:cTn id="4" fill="hold">
-                            <p:stCondLst>
-                              <p:cond delay="0"/>
-                            </p:stCondLst>
-                            <p:childTnLst>
                               <p:par>
-                                <p:cTn id="5" presetID="1" presetClass="entr" presetSubtype="0" fill="hold" grpId="0" nodeType="clickEffect">
+                                <p:cTn id="23" presetID="1" presetClass="entr" presetSubtype="0" fill="hold" grpId="0" nodeType="withEffect">
                                   <p:stCondLst>
                                     <p:cond delay="0"/>
                                   </p:stCondLst>
                                   <p:childTnLst>
                                     <p:set>
                                       <p:cBhvr>
-                                        <p:cTn id="6" dur="1" fill="hold">
+                                        <p:cTn id="24" dur="1" fill="hold">
                                           <p:stCondLst>
                                             <p:cond delay="0"/>
                                           </p:stCondLst>
@@ -8182,216 +8994,7 @@
                                         <p:tgtEl>
                                           <p:spTgt spid="3">
                                             <p:txEl>
-                                              <p:pRg st="0" end="0"/>
-                                            </p:txEl>
-                                          </p:spTgt>
-                                        </p:tgtEl>
-                                        <p:attrNameLst>
-                                          <p:attrName>style.visibility</p:attrName>
-                                        </p:attrNameLst>
-                                      </p:cBhvr>
-                                      <p:to>
-                                        <p:strVal val="visible"/>
-                                      </p:to>
-                                    </p:set>
-                                  </p:childTnLst>
-                                </p:cTn>
-                              </p:par>
-                              <p:par>
-                                <p:cTn id="7" presetID="1" presetClass="entr" presetSubtype="0" fill="hold" grpId="0" nodeType="withEffect">
-                                  <p:stCondLst>
-                                    <p:cond delay="0"/>
-                                  </p:stCondLst>
-                                  <p:childTnLst>
-                                    <p:set>
-                                      <p:cBhvr>
-                                        <p:cTn id="8" dur="1" fill="hold">
-                                          <p:stCondLst>
-                                            <p:cond delay="0"/>
-                                          </p:stCondLst>
-                                        </p:cTn>
-                                        <p:tgtEl>
-                                          <p:spTgt spid="3">
-                                            <p:txEl>
-                                              <p:pRg st="1" end="1"/>
-                                            </p:txEl>
-                                          </p:spTgt>
-                                        </p:tgtEl>
-                                        <p:attrNameLst>
-                                          <p:attrName>style.visibility</p:attrName>
-                                        </p:attrNameLst>
-                                      </p:cBhvr>
-                                      <p:to>
-                                        <p:strVal val="visible"/>
-                                      </p:to>
-                                    </p:set>
-                                  </p:childTnLst>
-                                </p:cTn>
-                              </p:par>
-                              <p:par>
-                                <p:cTn id="9" presetID="1" presetClass="entr" presetSubtype="0" fill="hold" grpId="0" nodeType="withEffect">
-                                  <p:stCondLst>
-                                    <p:cond delay="0"/>
-                                  </p:stCondLst>
-                                  <p:childTnLst>
-                                    <p:set>
-                                      <p:cBhvr>
-                                        <p:cTn id="10" dur="1" fill="hold">
-                                          <p:stCondLst>
-                                            <p:cond delay="0"/>
-                                          </p:stCondLst>
-                                        </p:cTn>
-                                        <p:tgtEl>
-                                          <p:spTgt spid="3">
-                                            <p:txEl>
-                                              <p:pRg st="2" end="2"/>
-                                            </p:txEl>
-                                          </p:spTgt>
-                                        </p:tgtEl>
-                                        <p:attrNameLst>
-                                          <p:attrName>style.visibility</p:attrName>
-                                        </p:attrNameLst>
-                                      </p:cBhvr>
-                                      <p:to>
-                                        <p:strVal val="visible"/>
-                                      </p:to>
-                                    </p:set>
-                                  </p:childTnLst>
-                                </p:cTn>
-                              </p:par>
-                            </p:childTnLst>
-                          </p:cTn>
-                        </p:par>
-                      </p:childTnLst>
-                    </p:cTn>
-                  </p:par>
-                  <p:par>
-                    <p:cTn id="11" fill="hold">
-                      <p:stCondLst>
-                        <p:cond delay="indefinite"/>
-                      </p:stCondLst>
-                      <p:childTnLst>
-                        <p:par>
-                          <p:cTn id="12" fill="hold">
-                            <p:stCondLst>
-                              <p:cond delay="0"/>
-                            </p:stCondLst>
-                            <p:childTnLst>
-                              <p:par>
-                                <p:cTn id="13" presetID="1" presetClass="entr" presetSubtype="0" fill="hold" grpId="0" nodeType="clickEffect">
-                                  <p:stCondLst>
-                                    <p:cond delay="0"/>
-                                  </p:stCondLst>
-                                  <p:childTnLst>
-                                    <p:set>
-                                      <p:cBhvr>
-                                        <p:cTn id="14" dur="1" fill="hold">
-                                          <p:stCondLst>
-                                            <p:cond delay="0"/>
-                                          </p:stCondLst>
-                                        </p:cTn>
-                                        <p:tgtEl>
-                                          <p:spTgt spid="3">
-                                            <p:txEl>
-                                              <p:pRg st="3" end="3"/>
-                                            </p:txEl>
-                                          </p:spTgt>
-                                        </p:tgtEl>
-                                        <p:attrNameLst>
-                                          <p:attrName>style.visibility</p:attrName>
-                                        </p:attrNameLst>
-                                      </p:cBhvr>
-                                      <p:to>
-                                        <p:strVal val="visible"/>
-                                      </p:to>
-                                    </p:set>
-                                  </p:childTnLst>
-                                </p:cTn>
-                              </p:par>
-                            </p:childTnLst>
-                          </p:cTn>
-                        </p:par>
-                      </p:childTnLst>
-                    </p:cTn>
-                  </p:par>
-                  <p:par>
-                    <p:cTn id="15" fill="hold">
-                      <p:stCondLst>
-                        <p:cond delay="indefinite"/>
-                      </p:stCondLst>
-                      <p:childTnLst>
-                        <p:par>
-                          <p:cTn id="16" fill="hold">
-                            <p:stCondLst>
-                              <p:cond delay="0"/>
-                            </p:stCondLst>
-                            <p:childTnLst>
-                              <p:par>
-                                <p:cTn id="17" presetID="1" presetClass="entr" presetSubtype="0" fill="hold" grpId="0" nodeType="clickEffect">
-                                  <p:stCondLst>
-                                    <p:cond delay="0"/>
-                                  </p:stCondLst>
-                                  <p:childTnLst>
-                                    <p:set>
-                                      <p:cBhvr>
-                                        <p:cTn id="18" dur="1" fill="hold">
-                                          <p:stCondLst>
-                                            <p:cond delay="0"/>
-                                          </p:stCondLst>
-                                        </p:cTn>
-                                        <p:tgtEl>
-                                          <p:spTgt spid="3">
-                                            <p:txEl>
-                                              <p:pRg st="4" end="4"/>
-                                            </p:txEl>
-                                          </p:spTgt>
-                                        </p:tgtEl>
-                                        <p:attrNameLst>
-                                          <p:attrName>style.visibility</p:attrName>
-                                        </p:attrNameLst>
-                                      </p:cBhvr>
-                                      <p:to>
-                                        <p:strVal val="visible"/>
-                                      </p:to>
-                                    </p:set>
-                                  </p:childTnLst>
-                                </p:cTn>
-                              </p:par>
-                            </p:childTnLst>
-                          </p:cTn>
-                        </p:par>
-                      </p:childTnLst>
-                    </p:cTn>
-                  </p:par>
-                  <p:par>
-                    <p:cTn id="19" fill="hold">
-                      <p:stCondLst>
-                        <p:cond delay="indefinite"/>
-                      </p:stCondLst>
-                      <p:childTnLst>
-                        <p:par>
-                          <p:cTn id="20" fill="hold">
-                            <p:stCondLst>
-                              <p:cond delay="0"/>
-                            </p:stCondLst>
-                            <p:childTnLst>
-                              <p:par>
-                                <p:cTn id="21" presetID="1" presetClass="entr" presetSubtype="0" fill="hold" grpId="0" nodeType="clickEffect">
-                                  <p:stCondLst>
-                                    <p:cond delay="0"/>
-                                  </p:stCondLst>
-                                  <p:childTnLst>
-                                    <p:set>
-                                      <p:cBhvr>
-                                        <p:cTn id="22" dur="1" fill="hold">
-                                          <p:stCondLst>
-                                            <p:cond delay="0"/>
-                                          </p:stCondLst>
-                                        </p:cTn>
-                                        <p:tgtEl>
-                                          <p:spTgt spid="3">
-                                            <p:txEl>
-                                              <p:pRg st="5" end="5"/>
+                                              <p:pRg st="8" end="8"/>
                                             </p:txEl>
                                           </p:spTgt>
                                         </p:tgtEl>

</xml_diff>